<commit_message>
feat: Enhanced SWOT presentation with visual templates
- Created 10-slide visual presentation inspired by professional templates
- Added 4-quadrant grid with color-coded sections (blue/orange/green/red)
- Individual slides for each SWOT element with large letters and icons
- TOWS Action Matrix slide with 4 strategy types
- Navy blue Operiva branding throughout
- Easy to fill in with bullet points
- SA-specific guided questions included
- Re-packaged and uploaded (350KB)
- Updated database with new download URL
</commit_message>
<xml_diff>
--- a/artifacts/04-SWOT-Analysis-Presentation.pptx
+++ b/artifacts/04-SWOT-Analysis-Presentation.pptx
@@ -15,9 +15,8 @@
     <p:sldId id="263" r:id="rId14"/>
     <p:sldId id="264" r:id="rId15"/>
     <p:sldId id="265" r:id="rId16"/>
-    <p:sldId id="266" r:id="rId17"/>
   </p:sldIdLst>
-  <p:sldSz cx="9144000" cy="6858000" type="screen4x3"/>
+  <p:sldSz cx="9144000" cy="5143500" type="screen4x3"/>
   <p:notesSz cx="6858000" cy="9144000"/>
   <p:defaultTextStyle>
     <a:defPPr>
@@ -3114,7 +3113,7 @@
         </p:nvSpPr>
         <p:spPr>
           <a:xfrm>
-            <a:off x="914400" y="2286000"/>
+            <a:off x="914400" y="1828800"/>
             <a:ext cx="7315200" cy="914400"/>
           </a:xfrm>
           <a:prstGeom prst="rect">
@@ -3136,7 +3135,7 @@
               </a:defRPr>
             </a:pPr>
             <a:r>
-              <a:t>Our Strategic Plan</a:t>
+              <a:t>SWOT Analysis Pack</a:t>
             </a:r>
           </a:p>
         </p:txBody>
@@ -3149,8 +3148,8 @@
         </p:nvSpPr>
         <p:spPr>
           <a:xfrm>
-            <a:off x="914400" y="3474720"/>
-            <a:ext cx="7315200" cy="731520"/>
+            <a:off x="914400" y="2926080"/>
+            <a:ext cx="7315200" cy="457200"/>
           </a:xfrm>
           <a:prstGeom prst="rect">
             <a:avLst/>
@@ -3171,7 +3170,7 @@
               </a:defRPr>
             </a:pPr>
             <a:r>
-              <a:t>[Your Business Name]</a:t>
+              <a:t>South African Edition</a:t>
             </a:r>
           </a:p>
         </p:txBody>
@@ -3185,92 +3184,6 @@
 </file>
 
 <file path=ppt/slides/slide10.xml><?xml version="1.0" encoding="utf-8"?>
-<p:sld xmlns:a="http://schemas.openxmlformats.org/drawingml/2006/main" xmlns:p="http://schemas.openxmlformats.org/presentationml/2006/main" xmlns:r="http://schemas.openxmlformats.org/officeDocument/2006/relationships">
-  <p:cSld>
-    <p:spTree>
-      <p:nvGrpSpPr>
-        <p:cNvPr id="1" name=""/>
-        <p:cNvGrpSpPr/>
-        <p:nvPr/>
-      </p:nvGrpSpPr>
-      <p:grpSpPr/>
-      <p:sp>
-        <p:nvSpPr>
-          <p:cNvPr id="2" name="TextBox 1"/>
-          <p:cNvSpPr txBox="1"/>
-          <p:nvPr/>
-        </p:nvSpPr>
-        <p:spPr>
-          <a:xfrm>
-            <a:off x="0" y="0"/>
-            <a:ext cx="9144000" cy="731520"/>
-          </a:xfrm>
-          <a:prstGeom prst="rect">
-            <a:avLst/>
-          </a:prstGeom>
-          <a:solidFill>
-            <a:srgbClr val="101C42"/>
-          </a:solidFill>
-        </p:spPr>
-        <p:txBody>
-          <a:bodyPr wrap="none" anchor="ctr" lIns="457200">
-            <a:spAutoFit/>
-          </a:bodyPr>
-          <a:lstStyle/>
-          <a:p>
-            <a:pPr>
-              <a:defRPr sz="2800" b="1">
-                <a:solidFill>
-                  <a:srgbClr val="FFFFFF"/>
-                </a:solidFill>
-              </a:defRPr>
-            </a:pPr>
-            <a:r>
-              <a:t>Our Next Steps</a:t>
-            </a:r>
-          </a:p>
-        </p:txBody>
-      </p:sp>
-      <p:sp>
-        <p:nvSpPr>
-          <p:cNvPr id="3" name="TextBox 2"/>
-          <p:cNvSpPr txBox="1"/>
-          <p:nvPr/>
-        </p:nvSpPr>
-        <p:spPr>
-          <a:xfrm>
-            <a:off x="731520" y="1371600"/>
-            <a:ext cx="7680960" cy="5029200"/>
-          </a:xfrm>
-          <a:prstGeom prst="rect">
-            <a:avLst/>
-          </a:prstGeom>
-          <a:noFill/>
-        </p:spPr>
-        <p:txBody>
-          <a:bodyPr wrap="square">
-            <a:spAutoFit/>
-          </a:bodyPr>
-          <a:lstStyle/>
-          <a:p>
-            <a:pPr>
-              <a:defRPr sz="1800"/>
-            </a:pPr>
-            <a:r>
-              <a:t>[Add your content here]</a:t>
-            </a:r>
-          </a:p>
-        </p:txBody>
-      </p:sp>
-    </p:spTree>
-  </p:cSld>
-  <p:clrMapOvr>
-    <a:masterClrMapping/>
-  </p:clrMapOvr>
-</p:sld>
-</file>
-
-<file path=ppt/slides/slide11.xml><?xml version="1.0" encoding="utf-8"?>
 <p:sld xmlns:a="http://schemas.openxmlformats.org/drawingml/2006/main" xmlns:p="http://schemas.openxmlformats.org/presentationml/2006/main" xmlns:r="http://schemas.openxmlformats.org/officeDocument/2006/relationships">
   <p:cSld>
     <p:bg>
@@ -3296,7 +3209,7 @@
         </p:nvSpPr>
         <p:spPr>
           <a:xfrm>
-            <a:off x="914400" y="2286000"/>
+            <a:off x="914400" y="1828800"/>
             <a:ext cx="7315200" cy="914400"/>
           </a:xfrm>
           <a:prstGeom prst="rect">
@@ -3318,7 +3231,7 @@
               </a:defRPr>
             </a:pPr>
             <a:r>
-              <a:t>Let's Execute!</a:t>
+              <a:t>Ready to Take Action?</a:t>
             </a:r>
           </a:p>
         </p:txBody>
@@ -3331,8 +3244,8 @@
         </p:nvSpPr>
         <p:spPr>
           <a:xfrm>
-            <a:off x="914400" y="3474720"/>
-            <a:ext cx="7315200" cy="731520"/>
+            <a:off x="914400" y="2926080"/>
+            <a:ext cx="7315200" cy="457200"/>
           </a:xfrm>
           <a:prstGeom prst="rect">
             <a:avLst/>
@@ -3353,7 +3266,7 @@
               </a:defRPr>
             </a:pPr>
             <a:r>
-              <a:t>Questions?</a:t>
+              <a:t>Use this SWOT analysis to drive your business forward</a:t>
             </a:r>
           </a:p>
         </p:txBody>
@@ -3369,6 +3282,14 @@
 <file path=ppt/slides/slide2.xml><?xml version="1.0" encoding="utf-8"?>
 <p:sld xmlns:a="http://schemas.openxmlformats.org/drawingml/2006/main" xmlns:p="http://schemas.openxmlformats.org/presentationml/2006/main" xmlns:r="http://schemas.openxmlformats.org/officeDocument/2006/relationships">
   <p:cSld>
+    <p:bg>
+      <p:bgPr>
+        <a:solidFill>
+          <a:srgbClr val="101C42"/>
+        </a:solidFill>
+        <a:effectLst/>
+      </p:bgPr>
+    </p:bg>
     <p:spTree>
       <p:nvGrpSpPr>
         <p:cNvPr id="1" name=""/>
@@ -3384,45 +3305,8 @@
         </p:nvSpPr>
         <p:spPr>
           <a:xfrm>
-            <a:off x="0" y="0"/>
-            <a:ext cx="9144000" cy="731520"/>
-          </a:xfrm>
-          <a:prstGeom prst="rect">
-            <a:avLst/>
-          </a:prstGeom>
-          <a:solidFill>
-            <a:srgbClr val="101C42"/>
-          </a:solidFill>
-        </p:spPr>
-        <p:txBody>
-          <a:bodyPr wrap="none" anchor="ctr" lIns="457200">
-            <a:spAutoFit/>
-          </a:bodyPr>
-          <a:lstStyle/>
-          <a:p>
-            <a:pPr>
-              <a:defRPr sz="2800" b="1">
-                <a:solidFill>
-                  <a:srgbClr val="FFFFFF"/>
-                </a:solidFill>
-              </a:defRPr>
-            </a:pPr>
-            <a:r>
-              <a:t>Our Strengths</a:t>
-            </a:r>
-          </a:p>
-        </p:txBody>
-      </p:sp>
-      <p:sp>
-        <p:nvSpPr>
-          <p:cNvPr id="3" name="TextBox 2"/>
-          <p:cNvSpPr txBox="1"/>
-          <p:nvPr/>
-        </p:nvSpPr>
-        <p:spPr>
-          <a:xfrm>
-            <a:off x="731520" y="1371600"/>
-            <a:ext cx="7680960" cy="5029200"/>
+            <a:off x="914400" y="1828800"/>
+            <a:ext cx="7315200" cy="914400"/>
           </a:xfrm>
           <a:prstGeom prst="rect">
             <a:avLst/>
@@ -3430,16 +3314,55 @@
           <a:noFill/>
         </p:spPr>
         <p:txBody>
-          <a:bodyPr wrap="square">
+          <a:bodyPr wrap="none">
             <a:spAutoFit/>
           </a:bodyPr>
           <a:lstStyle/>
           <a:p>
-            <a:pPr>
-              <a:defRPr sz="1800"/>
-            </a:pPr>
-            <a:r>
-              <a:t>[Add your content here]</a:t>
+            <a:pPr algn="ctr">
+              <a:defRPr sz="4400" b="1">
+                <a:solidFill>
+                  <a:srgbClr val="FFFFFF"/>
+                </a:solidFill>
+              </a:defRPr>
+            </a:pPr>
+            <a:r>
+              <a:t>Complete Your SWOT Analysis</a:t>
+            </a:r>
+          </a:p>
+        </p:txBody>
+      </p:sp>
+      <p:sp>
+        <p:nvSpPr>
+          <p:cNvPr id="3" name="TextBox 2"/>
+          <p:cNvSpPr txBox="1"/>
+          <p:nvPr/>
+        </p:nvSpPr>
+        <p:spPr>
+          <a:xfrm>
+            <a:off x="914400" y="2926080"/>
+            <a:ext cx="7315200" cy="457200"/>
+          </a:xfrm>
+          <a:prstGeom prst="rect">
+            <a:avLst/>
+          </a:prstGeom>
+          <a:noFill/>
+        </p:spPr>
+        <p:txBody>
+          <a:bodyPr wrap="none">
+            <a:spAutoFit/>
+          </a:bodyPr>
+          <a:lstStyle/>
+          <a:p>
+            <a:pPr algn="ctr">
+              <a:defRPr sz="2000">
+                <a:solidFill>
+                  <a:srgbClr val="FFFFFF"/>
+                </a:solidFill>
+              </a:defRPr>
+            </a:pPr>
+            <a:r>
+              <a:t>Use the following slides to identify your business position</a:t>
             </a:r>
           </a:p>
         </p:txBody>
@@ -3455,6 +3378,14 @@
 <file path=ppt/slides/slide3.xml><?xml version="1.0" encoding="utf-8"?>
 <p:sld xmlns:a="http://schemas.openxmlformats.org/drawingml/2006/main" xmlns:p="http://schemas.openxmlformats.org/presentationml/2006/main" xmlns:r="http://schemas.openxmlformats.org/officeDocument/2006/relationships">
   <p:cSld>
+    <p:bg>
+      <p:bgPr>
+        <a:solidFill>
+          <a:srgbClr val="FFFFFF"/>
+        </a:solidFill>
+        <a:effectLst/>
+      </p:bgPr>
+    </p:bg>
     <p:spTree>
       <p:nvGrpSpPr>
         <p:cNvPr id="1" name=""/>
@@ -3470,45 +3401,178 @@
         </p:nvSpPr>
         <p:spPr>
           <a:xfrm>
-            <a:off x="0" y="0"/>
-            <a:ext cx="9144000" cy="731520"/>
+            <a:off x="457200" y="274320"/>
+            <a:ext cx="8229600" cy="548640"/>
+          </a:xfrm>
+          <a:prstGeom prst="rect">
+            <a:avLst/>
+          </a:prstGeom>
+          <a:noFill/>
+        </p:spPr>
+        <p:txBody>
+          <a:bodyPr wrap="none">
+            <a:spAutoFit/>
+          </a:bodyPr>
+          <a:lstStyle/>
+          <a:p>
+            <a:pPr>
+              <a:defRPr sz="3200" b="1">
+                <a:solidFill>
+                  <a:srgbClr val="101C42"/>
+                </a:solidFill>
+              </a:defRPr>
+            </a:pPr>
+            <a:r>
+              <a:t>SWOT Analysis</a:t>
+            </a:r>
+          </a:p>
+        </p:txBody>
+      </p:sp>
+      <p:sp>
+        <p:nvSpPr>
+          <p:cNvPr id="3" name="Rectangle 2"/>
+          <p:cNvSpPr/>
+          <p:nvPr/>
+        </p:nvSpPr>
+        <p:spPr>
+          <a:xfrm>
+            <a:off x="4572000" y="1097280"/>
+            <a:ext cx="45720" cy="3657600"/>
           </a:xfrm>
           <a:prstGeom prst="rect">
             <a:avLst/>
           </a:prstGeom>
           <a:solidFill>
-            <a:srgbClr val="101C42"/>
+            <a:srgbClr val="FFFFFF"/>
           </a:solidFill>
-        </p:spPr>
-        <p:txBody>
-          <a:bodyPr wrap="none" anchor="ctr" lIns="457200">
-            <a:spAutoFit/>
-          </a:bodyPr>
-          <a:lstStyle/>
-          <a:p>
-            <a:pPr>
-              <a:defRPr sz="2800" b="1">
-                <a:solidFill>
-                  <a:srgbClr val="FFFFFF"/>
-                </a:solidFill>
-              </a:defRPr>
-            </a:pPr>
-            <a:r>
-              <a:t>Our Weaknesses (Areas to Improve)</a:t>
-            </a:r>
-          </a:p>
-        </p:txBody>
-      </p:sp>
-      <p:sp>
-        <p:nvSpPr>
-          <p:cNvPr id="3" name="TextBox 2"/>
+          <a:ln>
+            <a:solidFill>
+              <a:srgbClr val="FFFFFF"/>
+            </a:solidFill>
+          </a:ln>
+        </p:spPr>
+        <p:style>
+          <a:lnRef idx="1">
+            <a:schemeClr val="accent1"/>
+          </a:lnRef>
+          <a:fillRef idx="3">
+            <a:schemeClr val="accent1"/>
+          </a:fillRef>
+          <a:effectRef idx="2">
+            <a:schemeClr val="accent1"/>
+          </a:effectRef>
+          <a:fontRef idx="minor">
+            <a:schemeClr val="lt1"/>
+          </a:fontRef>
+        </p:style>
+        <p:txBody>
+          <a:bodyPr rtlCol="0" anchor="ctr"/>
+          <a:lstStyle/>
+          <a:p>
+            <a:pPr algn="ctr"/>
+          </a:p>
+        </p:txBody>
+      </p:sp>
+      <p:sp>
+        <p:nvSpPr>
+          <p:cNvPr id="4" name="Rectangle 3"/>
+          <p:cNvSpPr/>
+          <p:nvPr/>
+        </p:nvSpPr>
+        <p:spPr>
+          <a:xfrm>
+            <a:off x="457200" y="3108960"/>
+            <a:ext cx="8229600" cy="45720"/>
+          </a:xfrm>
+          <a:prstGeom prst="rect">
+            <a:avLst/>
+          </a:prstGeom>
+          <a:solidFill>
+            <a:srgbClr val="FFFFFF"/>
+          </a:solidFill>
+          <a:ln>
+            <a:solidFill>
+              <a:srgbClr val="FFFFFF"/>
+            </a:solidFill>
+          </a:ln>
+        </p:spPr>
+        <p:style>
+          <a:lnRef idx="1">
+            <a:schemeClr val="accent1"/>
+          </a:lnRef>
+          <a:fillRef idx="3">
+            <a:schemeClr val="accent1"/>
+          </a:fillRef>
+          <a:effectRef idx="2">
+            <a:schemeClr val="accent1"/>
+          </a:effectRef>
+          <a:fontRef idx="minor">
+            <a:schemeClr val="lt1"/>
+          </a:fontRef>
+        </p:style>
+        <p:txBody>
+          <a:bodyPr rtlCol="0" anchor="ctr"/>
+          <a:lstStyle/>
+          <a:p>
+            <a:pPr algn="ctr"/>
+          </a:p>
+        </p:txBody>
+      </p:sp>
+      <p:sp>
+        <p:nvSpPr>
+          <p:cNvPr id="5" name="Rectangle 4"/>
+          <p:cNvSpPr/>
+          <p:nvPr/>
+        </p:nvSpPr>
+        <p:spPr>
+          <a:xfrm>
+            <a:off x="457200" y="1097280"/>
+            <a:ext cx="4023360" cy="1965960"/>
+          </a:xfrm>
+          <a:prstGeom prst="rect">
+            <a:avLst/>
+          </a:prstGeom>
+          <a:solidFill>
+            <a:srgbClr val="2980B9"/>
+          </a:solidFill>
+          <a:ln>
+            <a:solidFill>
+              <a:srgbClr val="2980B9"/>
+            </a:solidFill>
+          </a:ln>
+        </p:spPr>
+        <p:style>
+          <a:lnRef idx="1">
+            <a:schemeClr val="accent1"/>
+          </a:lnRef>
+          <a:fillRef idx="3">
+            <a:schemeClr val="accent1"/>
+          </a:fillRef>
+          <a:effectRef idx="2">
+            <a:schemeClr val="accent1"/>
+          </a:effectRef>
+          <a:fontRef idx="minor">
+            <a:schemeClr val="lt1"/>
+          </a:fontRef>
+        </p:style>
+        <p:txBody>
+          <a:bodyPr rtlCol="0" anchor="ctr"/>
+          <a:lstStyle/>
+          <a:p>
+            <a:pPr algn="ctr"/>
+          </a:p>
+        </p:txBody>
+      </p:sp>
+      <p:sp>
+        <p:nvSpPr>
+          <p:cNvPr id="6" name="TextBox 5"/>
           <p:cNvSpPr txBox="1"/>
           <p:nvPr/>
         </p:nvSpPr>
         <p:spPr>
           <a:xfrm>
-            <a:off x="731520" y="1371600"/>
-            <a:ext cx="7680960" cy="5029200"/>
+            <a:off x="640080" y="1280160"/>
+            <a:ext cx="3657600" cy="457200"/>
           </a:xfrm>
           <a:prstGeom prst="rect">
             <a:avLst/>
@@ -3516,16 +3580,496 @@
           <a:noFill/>
         </p:spPr>
         <p:txBody>
-          <a:bodyPr wrap="square">
+          <a:bodyPr wrap="none">
             <a:spAutoFit/>
           </a:bodyPr>
           <a:lstStyle/>
           <a:p>
             <a:pPr>
-              <a:defRPr sz="1800"/>
-            </a:pPr>
-            <a:r>
-              <a:t>[Add your content here]</a:t>
+              <a:defRPr sz="2400" b="1">
+                <a:solidFill>
+                  <a:srgbClr val="FFFFFF"/>
+                </a:solidFill>
+              </a:defRPr>
+            </a:pPr>
+            <a:r>
+              <a:t>Strengths</a:t>
+            </a:r>
+          </a:p>
+        </p:txBody>
+      </p:sp>
+      <p:sp>
+        <p:nvSpPr>
+          <p:cNvPr id="7" name="TextBox 6"/>
+          <p:cNvSpPr txBox="1"/>
+          <p:nvPr/>
+        </p:nvSpPr>
+        <p:spPr>
+          <a:xfrm>
+            <a:off x="640080" y="1828800"/>
+            <a:ext cx="3657600" cy="1097280"/>
+          </a:xfrm>
+          <a:prstGeom prst="rect">
+            <a:avLst/>
+          </a:prstGeom>
+          <a:noFill/>
+        </p:spPr>
+        <p:txBody>
+          <a:bodyPr wrap="none">
+            <a:spAutoFit/>
+          </a:bodyPr>
+          <a:lstStyle/>
+          <a:p>
+            <a:pPr>
+              <a:defRPr sz="1400">
+                <a:solidFill>
+                  <a:srgbClr val="FFFFFF"/>
+                </a:solidFill>
+              </a:defRPr>
+            </a:pPr>
+            <a:r>
+              <a:t>• Add your strengths here</a:t>
+            </a:r>
+          </a:p>
+          <a:p>
+            <a:pPr>
+              <a:defRPr sz="1400">
+                <a:solidFill>
+                  <a:srgbClr val="FFFFFF"/>
+                </a:solidFill>
+              </a:defRPr>
+            </a:pPr>
+            <a:r>
+              <a:t>• Add your strengths here</a:t>
+            </a:r>
+          </a:p>
+          <a:p>
+            <a:pPr>
+              <a:defRPr sz="1400">
+                <a:solidFill>
+                  <a:srgbClr val="FFFFFF"/>
+                </a:solidFill>
+              </a:defRPr>
+            </a:pPr>
+            <a:r>
+              <a:t>• Add your strengths here</a:t>
+            </a:r>
+          </a:p>
+        </p:txBody>
+      </p:sp>
+      <p:sp>
+        <p:nvSpPr>
+          <p:cNvPr id="8" name="Rectangle 7"/>
+          <p:cNvSpPr/>
+          <p:nvPr/>
+        </p:nvSpPr>
+        <p:spPr>
+          <a:xfrm>
+            <a:off x="4663440" y="1097280"/>
+            <a:ext cx="4023360" cy="1965960"/>
+          </a:xfrm>
+          <a:prstGeom prst="rect">
+            <a:avLst/>
+          </a:prstGeom>
+          <a:solidFill>
+            <a:srgbClr val="F39C12"/>
+          </a:solidFill>
+          <a:ln>
+            <a:solidFill>
+              <a:srgbClr val="F39C12"/>
+            </a:solidFill>
+          </a:ln>
+        </p:spPr>
+        <p:style>
+          <a:lnRef idx="1">
+            <a:schemeClr val="accent1"/>
+          </a:lnRef>
+          <a:fillRef idx="3">
+            <a:schemeClr val="accent1"/>
+          </a:fillRef>
+          <a:effectRef idx="2">
+            <a:schemeClr val="accent1"/>
+          </a:effectRef>
+          <a:fontRef idx="minor">
+            <a:schemeClr val="lt1"/>
+          </a:fontRef>
+        </p:style>
+        <p:txBody>
+          <a:bodyPr rtlCol="0" anchor="ctr"/>
+          <a:lstStyle/>
+          <a:p>
+            <a:pPr algn="ctr"/>
+          </a:p>
+        </p:txBody>
+      </p:sp>
+      <p:sp>
+        <p:nvSpPr>
+          <p:cNvPr id="9" name="TextBox 8"/>
+          <p:cNvSpPr txBox="1"/>
+          <p:nvPr/>
+        </p:nvSpPr>
+        <p:spPr>
+          <a:xfrm>
+            <a:off x="4846320" y="1280160"/>
+            <a:ext cx="3657600" cy="457200"/>
+          </a:xfrm>
+          <a:prstGeom prst="rect">
+            <a:avLst/>
+          </a:prstGeom>
+          <a:noFill/>
+        </p:spPr>
+        <p:txBody>
+          <a:bodyPr wrap="none">
+            <a:spAutoFit/>
+          </a:bodyPr>
+          <a:lstStyle/>
+          <a:p>
+            <a:pPr>
+              <a:defRPr sz="2400" b="1">
+                <a:solidFill>
+                  <a:srgbClr val="FFFFFF"/>
+                </a:solidFill>
+              </a:defRPr>
+            </a:pPr>
+            <a:r>
+              <a:t>Weaknesses</a:t>
+            </a:r>
+          </a:p>
+        </p:txBody>
+      </p:sp>
+      <p:sp>
+        <p:nvSpPr>
+          <p:cNvPr id="10" name="TextBox 9"/>
+          <p:cNvSpPr txBox="1"/>
+          <p:nvPr/>
+        </p:nvSpPr>
+        <p:spPr>
+          <a:xfrm>
+            <a:off x="4846320" y="1828800"/>
+            <a:ext cx="3657600" cy="1097280"/>
+          </a:xfrm>
+          <a:prstGeom prst="rect">
+            <a:avLst/>
+          </a:prstGeom>
+          <a:noFill/>
+        </p:spPr>
+        <p:txBody>
+          <a:bodyPr wrap="none">
+            <a:spAutoFit/>
+          </a:bodyPr>
+          <a:lstStyle/>
+          <a:p>
+            <a:pPr>
+              <a:defRPr sz="1400">
+                <a:solidFill>
+                  <a:srgbClr val="FFFFFF"/>
+                </a:solidFill>
+              </a:defRPr>
+            </a:pPr>
+            <a:r>
+              <a:t>• Add your weaknesses here</a:t>
+            </a:r>
+          </a:p>
+          <a:p>
+            <a:pPr>
+              <a:defRPr sz="1400">
+                <a:solidFill>
+                  <a:srgbClr val="FFFFFF"/>
+                </a:solidFill>
+              </a:defRPr>
+            </a:pPr>
+            <a:r>
+              <a:t>• Add your weaknesses here</a:t>
+            </a:r>
+          </a:p>
+          <a:p>
+            <a:pPr>
+              <a:defRPr sz="1400">
+                <a:solidFill>
+                  <a:srgbClr val="FFFFFF"/>
+                </a:solidFill>
+              </a:defRPr>
+            </a:pPr>
+            <a:r>
+              <a:t>• Add your weaknesses here</a:t>
+            </a:r>
+          </a:p>
+        </p:txBody>
+      </p:sp>
+      <p:sp>
+        <p:nvSpPr>
+          <p:cNvPr id="11" name="Rectangle 10"/>
+          <p:cNvSpPr/>
+          <p:nvPr/>
+        </p:nvSpPr>
+        <p:spPr>
+          <a:xfrm>
+            <a:off x="457200" y="3154680"/>
+            <a:ext cx="4023360" cy="1965960"/>
+          </a:xfrm>
+          <a:prstGeom prst="rect">
+            <a:avLst/>
+          </a:prstGeom>
+          <a:solidFill>
+            <a:srgbClr val="27AE60"/>
+          </a:solidFill>
+          <a:ln>
+            <a:solidFill>
+              <a:srgbClr val="27AE60"/>
+            </a:solidFill>
+          </a:ln>
+        </p:spPr>
+        <p:style>
+          <a:lnRef idx="1">
+            <a:schemeClr val="accent1"/>
+          </a:lnRef>
+          <a:fillRef idx="3">
+            <a:schemeClr val="accent1"/>
+          </a:fillRef>
+          <a:effectRef idx="2">
+            <a:schemeClr val="accent1"/>
+          </a:effectRef>
+          <a:fontRef idx="minor">
+            <a:schemeClr val="lt1"/>
+          </a:fontRef>
+        </p:style>
+        <p:txBody>
+          <a:bodyPr rtlCol="0" anchor="ctr"/>
+          <a:lstStyle/>
+          <a:p>
+            <a:pPr algn="ctr"/>
+          </a:p>
+        </p:txBody>
+      </p:sp>
+      <p:sp>
+        <p:nvSpPr>
+          <p:cNvPr id="12" name="TextBox 11"/>
+          <p:cNvSpPr txBox="1"/>
+          <p:nvPr/>
+        </p:nvSpPr>
+        <p:spPr>
+          <a:xfrm>
+            <a:off x="640080" y="3337560"/>
+            <a:ext cx="3657600" cy="457200"/>
+          </a:xfrm>
+          <a:prstGeom prst="rect">
+            <a:avLst/>
+          </a:prstGeom>
+          <a:noFill/>
+        </p:spPr>
+        <p:txBody>
+          <a:bodyPr wrap="none">
+            <a:spAutoFit/>
+          </a:bodyPr>
+          <a:lstStyle/>
+          <a:p>
+            <a:pPr>
+              <a:defRPr sz="2400" b="1">
+                <a:solidFill>
+                  <a:srgbClr val="FFFFFF"/>
+                </a:solidFill>
+              </a:defRPr>
+            </a:pPr>
+            <a:r>
+              <a:t>Opportunities</a:t>
+            </a:r>
+          </a:p>
+        </p:txBody>
+      </p:sp>
+      <p:sp>
+        <p:nvSpPr>
+          <p:cNvPr id="13" name="TextBox 12"/>
+          <p:cNvSpPr txBox="1"/>
+          <p:nvPr/>
+        </p:nvSpPr>
+        <p:spPr>
+          <a:xfrm>
+            <a:off x="640080" y="3886200"/>
+            <a:ext cx="3657600" cy="1097280"/>
+          </a:xfrm>
+          <a:prstGeom prst="rect">
+            <a:avLst/>
+          </a:prstGeom>
+          <a:noFill/>
+        </p:spPr>
+        <p:txBody>
+          <a:bodyPr wrap="none">
+            <a:spAutoFit/>
+          </a:bodyPr>
+          <a:lstStyle/>
+          <a:p>
+            <a:pPr>
+              <a:defRPr sz="1400">
+                <a:solidFill>
+                  <a:srgbClr val="FFFFFF"/>
+                </a:solidFill>
+              </a:defRPr>
+            </a:pPr>
+            <a:r>
+              <a:t>• Add your opportunities here</a:t>
+            </a:r>
+          </a:p>
+          <a:p>
+            <a:pPr>
+              <a:defRPr sz="1400">
+                <a:solidFill>
+                  <a:srgbClr val="FFFFFF"/>
+                </a:solidFill>
+              </a:defRPr>
+            </a:pPr>
+            <a:r>
+              <a:t>• Add your opportunities here</a:t>
+            </a:r>
+          </a:p>
+          <a:p>
+            <a:pPr>
+              <a:defRPr sz="1400">
+                <a:solidFill>
+                  <a:srgbClr val="FFFFFF"/>
+                </a:solidFill>
+              </a:defRPr>
+            </a:pPr>
+            <a:r>
+              <a:t>• Add your opportunities here</a:t>
+            </a:r>
+          </a:p>
+        </p:txBody>
+      </p:sp>
+      <p:sp>
+        <p:nvSpPr>
+          <p:cNvPr id="14" name="Rectangle 13"/>
+          <p:cNvSpPr/>
+          <p:nvPr/>
+        </p:nvSpPr>
+        <p:spPr>
+          <a:xfrm>
+            <a:off x="4663440" y="3154680"/>
+            <a:ext cx="4023360" cy="1965960"/>
+          </a:xfrm>
+          <a:prstGeom prst="rect">
+            <a:avLst/>
+          </a:prstGeom>
+          <a:solidFill>
+            <a:srgbClr val="E74C3C"/>
+          </a:solidFill>
+          <a:ln>
+            <a:solidFill>
+              <a:srgbClr val="E74C3C"/>
+            </a:solidFill>
+          </a:ln>
+        </p:spPr>
+        <p:style>
+          <a:lnRef idx="1">
+            <a:schemeClr val="accent1"/>
+          </a:lnRef>
+          <a:fillRef idx="3">
+            <a:schemeClr val="accent1"/>
+          </a:fillRef>
+          <a:effectRef idx="2">
+            <a:schemeClr val="accent1"/>
+          </a:effectRef>
+          <a:fontRef idx="minor">
+            <a:schemeClr val="lt1"/>
+          </a:fontRef>
+        </p:style>
+        <p:txBody>
+          <a:bodyPr rtlCol="0" anchor="ctr"/>
+          <a:lstStyle/>
+          <a:p>
+            <a:pPr algn="ctr"/>
+          </a:p>
+        </p:txBody>
+      </p:sp>
+      <p:sp>
+        <p:nvSpPr>
+          <p:cNvPr id="15" name="TextBox 14"/>
+          <p:cNvSpPr txBox="1"/>
+          <p:nvPr/>
+        </p:nvSpPr>
+        <p:spPr>
+          <a:xfrm>
+            <a:off x="4846320" y="3337560"/>
+            <a:ext cx="3657600" cy="457200"/>
+          </a:xfrm>
+          <a:prstGeom prst="rect">
+            <a:avLst/>
+          </a:prstGeom>
+          <a:noFill/>
+        </p:spPr>
+        <p:txBody>
+          <a:bodyPr wrap="none">
+            <a:spAutoFit/>
+          </a:bodyPr>
+          <a:lstStyle/>
+          <a:p>
+            <a:pPr>
+              <a:defRPr sz="2400" b="1">
+                <a:solidFill>
+                  <a:srgbClr val="FFFFFF"/>
+                </a:solidFill>
+              </a:defRPr>
+            </a:pPr>
+            <a:r>
+              <a:t>Threats</a:t>
+            </a:r>
+          </a:p>
+        </p:txBody>
+      </p:sp>
+      <p:sp>
+        <p:nvSpPr>
+          <p:cNvPr id="16" name="TextBox 15"/>
+          <p:cNvSpPr txBox="1"/>
+          <p:nvPr/>
+        </p:nvSpPr>
+        <p:spPr>
+          <a:xfrm>
+            <a:off x="4846320" y="3886200"/>
+            <a:ext cx="3657600" cy="1097280"/>
+          </a:xfrm>
+          <a:prstGeom prst="rect">
+            <a:avLst/>
+          </a:prstGeom>
+          <a:noFill/>
+        </p:spPr>
+        <p:txBody>
+          <a:bodyPr wrap="none">
+            <a:spAutoFit/>
+          </a:bodyPr>
+          <a:lstStyle/>
+          <a:p>
+            <a:pPr>
+              <a:defRPr sz="1400">
+                <a:solidFill>
+                  <a:srgbClr val="FFFFFF"/>
+                </a:solidFill>
+              </a:defRPr>
+            </a:pPr>
+            <a:r>
+              <a:t>• Add your threats here</a:t>
+            </a:r>
+          </a:p>
+          <a:p>
+            <a:pPr>
+              <a:defRPr sz="1400">
+                <a:solidFill>
+                  <a:srgbClr val="FFFFFF"/>
+                </a:solidFill>
+              </a:defRPr>
+            </a:pPr>
+            <a:r>
+              <a:t>• Add your threats here</a:t>
+            </a:r>
+          </a:p>
+          <a:p>
+            <a:pPr>
+              <a:defRPr sz="1400">
+                <a:solidFill>
+                  <a:srgbClr val="FFFFFF"/>
+                </a:solidFill>
+              </a:defRPr>
+            </a:pPr>
+            <a:r>
+              <a:t>• Add your threats here</a:t>
             </a:r>
           </a:p>
         </p:txBody>
@@ -3541,6 +4085,14 @@
 <file path=ppt/slides/slide4.xml><?xml version="1.0" encoding="utf-8"?>
 <p:sld xmlns:a="http://schemas.openxmlformats.org/drawingml/2006/main" xmlns:p="http://schemas.openxmlformats.org/presentationml/2006/main" xmlns:r="http://schemas.openxmlformats.org/officeDocument/2006/relationships">
   <p:cSld>
+    <p:bg>
+      <p:bgPr>
+        <a:solidFill>
+          <a:srgbClr val="101C42"/>
+        </a:solidFill>
+        <a:effectLst/>
+      </p:bgPr>
+    </p:bg>
     <p:spTree>
       <p:nvGrpSpPr>
         <p:cNvPr id="1" name=""/>
@@ -3556,45 +4108,88 @@
         </p:nvSpPr>
         <p:spPr>
           <a:xfrm>
-            <a:off x="0" y="0"/>
-            <a:ext cx="9144000" cy="731520"/>
+            <a:off x="457200" y="1371600"/>
+            <a:ext cx="1828800" cy="1828800"/>
+          </a:xfrm>
+          <a:prstGeom prst="rect">
+            <a:avLst/>
+          </a:prstGeom>
+          <a:noFill/>
+        </p:spPr>
+        <p:txBody>
+          <a:bodyPr wrap="none">
+            <a:spAutoFit/>
+          </a:bodyPr>
+          <a:lstStyle/>
+          <a:p>
+            <a:pPr algn="ctr">
+              <a:defRPr sz="12000" b="1">
+                <a:solidFill>
+                  <a:srgbClr val="2980B9"/>
+                </a:solidFill>
+              </a:defRPr>
+            </a:pPr>
+            <a:r>
+              <a:t>S</a:t>
+            </a:r>
+          </a:p>
+        </p:txBody>
+      </p:sp>
+      <p:sp>
+        <p:nvSpPr>
+          <p:cNvPr id="3" name="Rectangle 2"/>
+          <p:cNvSpPr/>
+          <p:nvPr/>
+        </p:nvSpPr>
+        <p:spPr>
+          <a:xfrm>
+            <a:off x="2743200" y="914400"/>
+            <a:ext cx="73152" cy="3657600"/>
           </a:xfrm>
           <a:prstGeom prst="rect">
             <a:avLst/>
           </a:prstGeom>
           <a:solidFill>
-            <a:srgbClr val="101C42"/>
+            <a:srgbClr val="FFFFFF"/>
           </a:solidFill>
-        </p:spPr>
-        <p:txBody>
-          <a:bodyPr wrap="none" anchor="ctr" lIns="457200">
-            <a:spAutoFit/>
-          </a:bodyPr>
-          <a:lstStyle/>
-          <a:p>
-            <a:pPr>
-              <a:defRPr sz="2800" b="1">
-                <a:solidFill>
-                  <a:srgbClr val="FFFFFF"/>
-                </a:solidFill>
-              </a:defRPr>
-            </a:pPr>
-            <a:r>
-              <a:t>Our Opportunities</a:t>
-            </a:r>
-          </a:p>
-        </p:txBody>
-      </p:sp>
-      <p:sp>
-        <p:nvSpPr>
-          <p:cNvPr id="3" name="TextBox 2"/>
+          <a:ln>
+            <a:solidFill>
+              <a:srgbClr val="FFFFFF"/>
+            </a:solidFill>
+          </a:ln>
+        </p:spPr>
+        <p:style>
+          <a:lnRef idx="1">
+            <a:schemeClr val="accent1"/>
+          </a:lnRef>
+          <a:fillRef idx="3">
+            <a:schemeClr val="accent1"/>
+          </a:fillRef>
+          <a:effectRef idx="2">
+            <a:schemeClr val="accent1"/>
+          </a:effectRef>
+          <a:fontRef idx="minor">
+            <a:schemeClr val="lt1"/>
+          </a:fontRef>
+        </p:style>
+        <p:txBody>
+          <a:bodyPr rtlCol="0" anchor="ctr"/>
+          <a:lstStyle/>
+          <a:p>
+            <a:pPr algn="ctr"/>
+          </a:p>
+        </p:txBody>
+      </p:sp>
+      <p:sp>
+        <p:nvSpPr>
+          <p:cNvPr id="4" name="TextBox 3"/>
           <p:cNvSpPr txBox="1"/>
           <p:nvPr/>
         </p:nvSpPr>
         <p:spPr>
           <a:xfrm>
-            <a:off x="731520" y="1371600"/>
-            <a:ext cx="7680960" cy="5029200"/>
+            <a:off x="3200400" y="914400"/>
+            <a:ext cx="5486400" cy="731520"/>
           </a:xfrm>
           <a:prstGeom prst="rect">
             <a:avLst/>
@@ -3602,16 +4197,103 @@
           <a:noFill/>
         </p:spPr>
         <p:txBody>
-          <a:bodyPr wrap="square">
+          <a:bodyPr wrap="none">
             <a:spAutoFit/>
           </a:bodyPr>
           <a:lstStyle/>
           <a:p>
             <a:pPr>
-              <a:defRPr sz="1800"/>
-            </a:pPr>
-            <a:r>
-              <a:t>[Add your content here]</a:t>
+              <a:defRPr sz="3600" b="1">
+                <a:solidFill>
+                  <a:srgbClr val="FFFFFF"/>
+                </a:solidFill>
+              </a:defRPr>
+            </a:pPr>
+            <a:r>
+              <a:t>STRENGTHS</a:t>
+            </a:r>
+          </a:p>
+        </p:txBody>
+      </p:sp>
+      <p:sp>
+        <p:nvSpPr>
+          <p:cNvPr id="5" name="TextBox 4"/>
+          <p:cNvSpPr txBox="1"/>
+          <p:nvPr/>
+        </p:nvSpPr>
+        <p:spPr>
+          <a:xfrm>
+            <a:off x="3200400" y="2011680"/>
+            <a:ext cx="5486400" cy="2743200"/>
+          </a:xfrm>
+          <a:prstGeom prst="rect">
+            <a:avLst/>
+          </a:prstGeom>
+          <a:noFill/>
+        </p:spPr>
+        <p:txBody>
+          <a:bodyPr wrap="none">
+            <a:spAutoFit/>
+          </a:bodyPr>
+          <a:lstStyle/>
+          <a:p>
+            <a:pPr>
+              <a:defRPr sz="1600">
+                <a:solidFill>
+                  <a:srgbClr val="FFFFFF"/>
+                </a:solidFill>
+              </a:defRPr>
+            </a:pPr>
+            <a:r>
+              <a:t>• What do customers consistently compliment you on?</a:t>
+            </a:r>
+          </a:p>
+          <a:p>
+            <a:pPr>
+              <a:defRPr sz="1600">
+                <a:solidFill>
+                  <a:srgbClr val="FFFFFF"/>
+                </a:solidFill>
+              </a:defRPr>
+            </a:pPr>
+            <a:r>
+              <a:t>• What unique skills or resources do you have?</a:t>
+            </a:r>
+          </a:p>
+          <a:p>
+            <a:pPr>
+              <a:defRPr sz="1600">
+                <a:solidFill>
+                  <a:srgbClr val="FFFFFF"/>
+                </a:solidFill>
+              </a:defRPr>
+            </a:pPr>
+            <a:r>
+              <a:t>• What do you do better than competitors?</a:t>
+            </a:r>
+          </a:p>
+          <a:p>
+            <a:pPr>
+              <a:defRPr sz="1600">
+                <a:solidFill>
+                  <a:srgbClr val="FFFFFF"/>
+                </a:solidFill>
+              </a:defRPr>
+            </a:pPr>
+            <a:r>
+              <a:t>• Do you have strong B-BBEE credentials?</a:t>
+            </a:r>
+          </a:p>
+          <a:p>
+            <a:pPr>
+              <a:defRPr sz="1600">
+                <a:solidFill>
+                  <a:srgbClr val="FFFFFF"/>
+                </a:solidFill>
+              </a:defRPr>
+            </a:pPr>
+            <a:r>
+              <a:t>• What are your competitive advantages?</a:t>
             </a:r>
           </a:p>
         </p:txBody>
@@ -3627,6 +4309,14 @@
 <file path=ppt/slides/slide5.xml><?xml version="1.0" encoding="utf-8"?>
 <p:sld xmlns:a="http://schemas.openxmlformats.org/drawingml/2006/main" xmlns:p="http://schemas.openxmlformats.org/presentationml/2006/main" xmlns:r="http://schemas.openxmlformats.org/officeDocument/2006/relationships">
   <p:cSld>
+    <p:bg>
+      <p:bgPr>
+        <a:solidFill>
+          <a:srgbClr val="101C42"/>
+        </a:solidFill>
+        <a:effectLst/>
+      </p:bgPr>
+    </p:bg>
     <p:spTree>
       <p:nvGrpSpPr>
         <p:cNvPr id="1" name=""/>
@@ -3642,45 +4332,88 @@
         </p:nvSpPr>
         <p:spPr>
           <a:xfrm>
-            <a:off x="0" y="0"/>
-            <a:ext cx="9144000" cy="731520"/>
+            <a:off x="457200" y="1371600"/>
+            <a:ext cx="1828800" cy="1828800"/>
+          </a:xfrm>
+          <a:prstGeom prst="rect">
+            <a:avLst/>
+          </a:prstGeom>
+          <a:noFill/>
+        </p:spPr>
+        <p:txBody>
+          <a:bodyPr wrap="none">
+            <a:spAutoFit/>
+          </a:bodyPr>
+          <a:lstStyle/>
+          <a:p>
+            <a:pPr algn="ctr">
+              <a:defRPr sz="12000" b="1">
+                <a:solidFill>
+                  <a:srgbClr val="F39C12"/>
+                </a:solidFill>
+              </a:defRPr>
+            </a:pPr>
+            <a:r>
+              <a:t>W</a:t>
+            </a:r>
+          </a:p>
+        </p:txBody>
+      </p:sp>
+      <p:sp>
+        <p:nvSpPr>
+          <p:cNvPr id="3" name="Rectangle 2"/>
+          <p:cNvSpPr/>
+          <p:nvPr/>
+        </p:nvSpPr>
+        <p:spPr>
+          <a:xfrm>
+            <a:off x="2743200" y="914400"/>
+            <a:ext cx="73152" cy="3657600"/>
           </a:xfrm>
           <a:prstGeom prst="rect">
             <a:avLst/>
           </a:prstGeom>
           <a:solidFill>
-            <a:srgbClr val="101C42"/>
+            <a:srgbClr val="FFFFFF"/>
           </a:solidFill>
-        </p:spPr>
-        <p:txBody>
-          <a:bodyPr wrap="none" anchor="ctr" lIns="457200">
-            <a:spAutoFit/>
-          </a:bodyPr>
-          <a:lstStyle/>
-          <a:p>
-            <a:pPr>
-              <a:defRPr sz="2800" b="1">
-                <a:solidFill>
-                  <a:srgbClr val="FFFFFF"/>
-                </a:solidFill>
-              </a:defRPr>
-            </a:pPr>
-            <a:r>
-              <a:t>Our Threats</a:t>
-            </a:r>
-          </a:p>
-        </p:txBody>
-      </p:sp>
-      <p:sp>
-        <p:nvSpPr>
-          <p:cNvPr id="3" name="TextBox 2"/>
+          <a:ln>
+            <a:solidFill>
+              <a:srgbClr val="FFFFFF"/>
+            </a:solidFill>
+          </a:ln>
+        </p:spPr>
+        <p:style>
+          <a:lnRef idx="1">
+            <a:schemeClr val="accent1"/>
+          </a:lnRef>
+          <a:fillRef idx="3">
+            <a:schemeClr val="accent1"/>
+          </a:fillRef>
+          <a:effectRef idx="2">
+            <a:schemeClr val="accent1"/>
+          </a:effectRef>
+          <a:fontRef idx="minor">
+            <a:schemeClr val="lt1"/>
+          </a:fontRef>
+        </p:style>
+        <p:txBody>
+          <a:bodyPr rtlCol="0" anchor="ctr"/>
+          <a:lstStyle/>
+          <a:p>
+            <a:pPr algn="ctr"/>
+          </a:p>
+        </p:txBody>
+      </p:sp>
+      <p:sp>
+        <p:nvSpPr>
+          <p:cNvPr id="4" name="TextBox 3"/>
           <p:cNvSpPr txBox="1"/>
           <p:nvPr/>
         </p:nvSpPr>
         <p:spPr>
           <a:xfrm>
-            <a:off x="731520" y="1371600"/>
-            <a:ext cx="7680960" cy="5029200"/>
+            <a:off x="3200400" y="914400"/>
+            <a:ext cx="5486400" cy="731520"/>
           </a:xfrm>
           <a:prstGeom prst="rect">
             <a:avLst/>
@@ -3688,16 +4421,103 @@
           <a:noFill/>
         </p:spPr>
         <p:txBody>
-          <a:bodyPr wrap="square">
+          <a:bodyPr wrap="none">
             <a:spAutoFit/>
           </a:bodyPr>
           <a:lstStyle/>
           <a:p>
             <a:pPr>
-              <a:defRPr sz="1800"/>
-            </a:pPr>
-            <a:r>
-              <a:t>[Add your content here]</a:t>
+              <a:defRPr sz="3600" b="1">
+                <a:solidFill>
+                  <a:srgbClr val="FFFFFF"/>
+                </a:solidFill>
+              </a:defRPr>
+            </a:pPr>
+            <a:r>
+              <a:t>WEAKNESSES</a:t>
+            </a:r>
+          </a:p>
+        </p:txBody>
+      </p:sp>
+      <p:sp>
+        <p:nvSpPr>
+          <p:cNvPr id="5" name="TextBox 4"/>
+          <p:cNvSpPr txBox="1"/>
+          <p:nvPr/>
+        </p:nvSpPr>
+        <p:spPr>
+          <a:xfrm>
+            <a:off x="3200400" y="2011680"/>
+            <a:ext cx="5486400" cy="2743200"/>
+          </a:xfrm>
+          <a:prstGeom prst="rect">
+            <a:avLst/>
+          </a:prstGeom>
+          <a:noFill/>
+        </p:spPr>
+        <p:txBody>
+          <a:bodyPr wrap="none">
+            <a:spAutoFit/>
+          </a:bodyPr>
+          <a:lstStyle/>
+          <a:p>
+            <a:pPr>
+              <a:defRPr sz="1600">
+                <a:solidFill>
+                  <a:srgbClr val="FFFFFF"/>
+                </a:solidFill>
+              </a:defRPr>
+            </a:pPr>
+            <a:r>
+              <a:t>• How many hours/sales lost to loadshedding?</a:t>
+            </a:r>
+          </a:p>
+          <a:p>
+            <a:pPr>
+              <a:defRPr sz="1600">
+                <a:solidFill>
+                  <a:srgbClr val="FFFFFF"/>
+                </a:solidFill>
+              </a:defRPr>
+            </a:pPr>
+            <a:r>
+              <a:t>• Do you track income and expenses formally?</a:t>
+            </a:r>
+          </a:p>
+          <a:p>
+            <a:pPr>
+              <a:defRPr sz="1600">
+                <a:solidFill>
+                  <a:srgbClr val="FFFFFF"/>
+                </a:solidFill>
+              </a:defRPr>
+            </a:pPr>
+            <a:r>
+              <a:t>• What skills or resources are you missing?</a:t>
+            </a:r>
+          </a:p>
+          <a:p>
+            <a:pPr>
+              <a:defRPr sz="1600">
+                <a:solidFill>
+                  <a:srgbClr val="FFFFFF"/>
+                </a:solidFill>
+              </a:defRPr>
+            </a:pPr>
+            <a:r>
+              <a:t>• What do competitors do better than you?</a:t>
+            </a:r>
+          </a:p>
+          <a:p>
+            <a:pPr>
+              <a:defRPr sz="1600">
+                <a:solidFill>
+                  <a:srgbClr val="FFFFFF"/>
+                </a:solidFill>
+              </a:defRPr>
+            </a:pPr>
+            <a:r>
+              <a:t>• What do customers complain about?</a:t>
             </a:r>
           </a:p>
         </p:txBody>
@@ -3713,6 +4533,14 @@
 <file path=ppt/slides/slide6.xml><?xml version="1.0" encoding="utf-8"?>
 <p:sld xmlns:a="http://schemas.openxmlformats.org/drawingml/2006/main" xmlns:p="http://schemas.openxmlformats.org/presentationml/2006/main" xmlns:r="http://schemas.openxmlformats.org/officeDocument/2006/relationships">
   <p:cSld>
+    <p:bg>
+      <p:bgPr>
+        <a:solidFill>
+          <a:srgbClr val="101C42"/>
+        </a:solidFill>
+        <a:effectLst/>
+      </p:bgPr>
+    </p:bg>
     <p:spTree>
       <p:nvGrpSpPr>
         <p:cNvPr id="1" name=""/>
@@ -3728,45 +4556,88 @@
         </p:nvSpPr>
         <p:spPr>
           <a:xfrm>
-            <a:off x="0" y="0"/>
-            <a:ext cx="9144000" cy="731520"/>
+            <a:off x="457200" y="1371600"/>
+            <a:ext cx="1828800" cy="1828800"/>
+          </a:xfrm>
+          <a:prstGeom prst="rect">
+            <a:avLst/>
+          </a:prstGeom>
+          <a:noFill/>
+        </p:spPr>
+        <p:txBody>
+          <a:bodyPr wrap="none">
+            <a:spAutoFit/>
+          </a:bodyPr>
+          <a:lstStyle/>
+          <a:p>
+            <a:pPr algn="ctr">
+              <a:defRPr sz="12000" b="1">
+                <a:solidFill>
+                  <a:srgbClr val="27AE60"/>
+                </a:solidFill>
+              </a:defRPr>
+            </a:pPr>
+            <a:r>
+              <a:t>O</a:t>
+            </a:r>
+          </a:p>
+        </p:txBody>
+      </p:sp>
+      <p:sp>
+        <p:nvSpPr>
+          <p:cNvPr id="3" name="Rectangle 2"/>
+          <p:cNvSpPr/>
+          <p:nvPr/>
+        </p:nvSpPr>
+        <p:spPr>
+          <a:xfrm>
+            <a:off x="2743200" y="914400"/>
+            <a:ext cx="73152" cy="3657600"/>
           </a:xfrm>
           <a:prstGeom prst="rect">
             <a:avLst/>
           </a:prstGeom>
           <a:solidFill>
-            <a:srgbClr val="101C42"/>
+            <a:srgbClr val="FFFFFF"/>
           </a:solidFill>
-        </p:spPr>
-        <p:txBody>
-          <a:bodyPr wrap="none" anchor="ctr" lIns="457200">
-            <a:spAutoFit/>
-          </a:bodyPr>
-          <a:lstStyle/>
-          <a:p>
-            <a:pPr>
-              <a:defRPr sz="2800" b="1">
-                <a:solidFill>
-                  <a:srgbClr val="FFFFFF"/>
-                </a:solidFill>
-              </a:defRPr>
-            </a:pPr>
-            <a:r>
-              <a:t>SO Strategy: Attack (Use Strengths to maximize Opportunities)</a:t>
-            </a:r>
-          </a:p>
-        </p:txBody>
-      </p:sp>
-      <p:sp>
-        <p:nvSpPr>
-          <p:cNvPr id="3" name="TextBox 2"/>
+          <a:ln>
+            <a:solidFill>
+              <a:srgbClr val="FFFFFF"/>
+            </a:solidFill>
+          </a:ln>
+        </p:spPr>
+        <p:style>
+          <a:lnRef idx="1">
+            <a:schemeClr val="accent1"/>
+          </a:lnRef>
+          <a:fillRef idx="3">
+            <a:schemeClr val="accent1"/>
+          </a:fillRef>
+          <a:effectRef idx="2">
+            <a:schemeClr val="accent1"/>
+          </a:effectRef>
+          <a:fontRef idx="minor">
+            <a:schemeClr val="lt1"/>
+          </a:fontRef>
+        </p:style>
+        <p:txBody>
+          <a:bodyPr rtlCol="0" anchor="ctr"/>
+          <a:lstStyle/>
+          <a:p>
+            <a:pPr algn="ctr"/>
+          </a:p>
+        </p:txBody>
+      </p:sp>
+      <p:sp>
+        <p:nvSpPr>
+          <p:cNvPr id="4" name="TextBox 3"/>
           <p:cNvSpPr txBox="1"/>
           <p:nvPr/>
         </p:nvSpPr>
         <p:spPr>
           <a:xfrm>
-            <a:off x="731520" y="1371600"/>
-            <a:ext cx="7680960" cy="5029200"/>
+            <a:off x="3200400" y="914400"/>
+            <a:ext cx="5486400" cy="731520"/>
           </a:xfrm>
           <a:prstGeom prst="rect">
             <a:avLst/>
@@ -3774,16 +4645,103 @@
           <a:noFill/>
         </p:spPr>
         <p:txBody>
-          <a:bodyPr wrap="square">
+          <a:bodyPr wrap="none">
             <a:spAutoFit/>
           </a:bodyPr>
           <a:lstStyle/>
           <a:p>
             <a:pPr>
-              <a:defRPr sz="1800"/>
-            </a:pPr>
-            <a:r>
-              <a:t>[Add your content here]</a:t>
+              <a:defRPr sz="3600" b="1">
+                <a:solidFill>
+                  <a:srgbClr val="FFFFFF"/>
+                </a:solidFill>
+              </a:defRPr>
+            </a:pPr>
+            <a:r>
+              <a:t>OPPORTUNITIES</a:t>
+            </a:r>
+          </a:p>
+        </p:txBody>
+      </p:sp>
+      <p:sp>
+        <p:nvSpPr>
+          <p:cNvPr id="5" name="TextBox 4"/>
+          <p:cNvSpPr txBox="1"/>
+          <p:nvPr/>
+        </p:nvSpPr>
+        <p:spPr>
+          <a:xfrm>
+            <a:off x="3200400" y="2011680"/>
+            <a:ext cx="5486400" cy="2743200"/>
+          </a:xfrm>
+          <a:prstGeom prst="rect">
+            <a:avLst/>
+          </a:prstGeom>
+          <a:noFill/>
+        </p:spPr>
+        <p:txBody>
+          <a:bodyPr wrap="none">
+            <a:spAutoFit/>
+          </a:bodyPr>
+          <a:lstStyle/>
+          <a:p>
+            <a:pPr>
+              <a:defRPr sz="1600">
+                <a:solidFill>
+                  <a:srgbClr val="FFFFFF"/>
+                </a:solidFill>
+              </a:defRPr>
+            </a:pPr>
+            <a:r>
+              <a:t>• Are there affordable digital tools you could use?</a:t>
+            </a:r>
+          </a:p>
+          <a:p>
+            <a:pPr>
+              <a:defRPr sz="1600">
+                <a:solidFill>
+                  <a:srgbClr val="FFFFFF"/>
+                </a:solidFill>
+              </a:defRPr>
+            </a:pPr>
+            <a:r>
+              <a:t>• Are you aware of SEDA, SEFA, NEF funding?</a:t>
+            </a:r>
+          </a:p>
+          <a:p>
+            <a:pPr>
+              <a:defRPr sz="1600">
+                <a:solidFill>
+                  <a:srgbClr val="FFFFFF"/>
+                </a:solidFill>
+              </a:defRPr>
+            </a:pPr>
+            <a:r>
+              <a:t>• Are there new markets you could enter?</a:t>
+            </a:r>
+          </a:p>
+          <a:p>
+            <a:pPr>
+              <a:defRPr sz="1600">
+                <a:solidFill>
+                  <a:srgbClr val="FFFFFF"/>
+                </a:solidFill>
+              </a:defRPr>
+            </a:pPr>
+            <a:r>
+              <a:t>• Could you partner with other businesses?</a:t>
+            </a:r>
+          </a:p>
+          <a:p>
+            <a:pPr>
+              <a:defRPr sz="1600">
+                <a:solidFill>
+                  <a:srgbClr val="FFFFFF"/>
+                </a:solidFill>
+              </a:defRPr>
+            </a:pPr>
+            <a:r>
+              <a:t>• What trends could benefit your business?</a:t>
             </a:r>
           </a:p>
         </p:txBody>
@@ -3799,6 +4757,14 @@
 <file path=ppt/slides/slide7.xml><?xml version="1.0" encoding="utf-8"?>
 <p:sld xmlns:a="http://schemas.openxmlformats.org/drawingml/2006/main" xmlns:p="http://schemas.openxmlformats.org/presentationml/2006/main" xmlns:r="http://schemas.openxmlformats.org/officeDocument/2006/relationships">
   <p:cSld>
+    <p:bg>
+      <p:bgPr>
+        <a:solidFill>
+          <a:srgbClr val="101C42"/>
+        </a:solidFill>
+        <a:effectLst/>
+      </p:bgPr>
+    </p:bg>
     <p:spTree>
       <p:nvGrpSpPr>
         <p:cNvPr id="1" name=""/>
@@ -3814,45 +4780,88 @@
         </p:nvSpPr>
         <p:spPr>
           <a:xfrm>
-            <a:off x="0" y="0"/>
-            <a:ext cx="9144000" cy="731520"/>
+            <a:off x="457200" y="1371600"/>
+            <a:ext cx="1828800" cy="1828800"/>
+          </a:xfrm>
+          <a:prstGeom prst="rect">
+            <a:avLst/>
+          </a:prstGeom>
+          <a:noFill/>
+        </p:spPr>
+        <p:txBody>
+          <a:bodyPr wrap="none">
+            <a:spAutoFit/>
+          </a:bodyPr>
+          <a:lstStyle/>
+          <a:p>
+            <a:pPr algn="ctr">
+              <a:defRPr sz="12000" b="1">
+                <a:solidFill>
+                  <a:srgbClr val="E74C3C"/>
+                </a:solidFill>
+              </a:defRPr>
+            </a:pPr>
+            <a:r>
+              <a:t>T</a:t>
+            </a:r>
+          </a:p>
+        </p:txBody>
+      </p:sp>
+      <p:sp>
+        <p:nvSpPr>
+          <p:cNvPr id="3" name="Rectangle 2"/>
+          <p:cNvSpPr/>
+          <p:nvPr/>
+        </p:nvSpPr>
+        <p:spPr>
+          <a:xfrm>
+            <a:off x="2743200" y="914400"/>
+            <a:ext cx="73152" cy="3657600"/>
           </a:xfrm>
           <a:prstGeom prst="rect">
             <a:avLst/>
           </a:prstGeom>
           <a:solidFill>
-            <a:srgbClr val="101C42"/>
+            <a:srgbClr val="FFFFFF"/>
           </a:solidFill>
-        </p:spPr>
-        <p:txBody>
-          <a:bodyPr wrap="none" anchor="ctr" lIns="457200">
-            <a:spAutoFit/>
-          </a:bodyPr>
-          <a:lstStyle/>
-          <a:p>
-            <a:pPr>
-              <a:defRPr sz="2800" b="1">
-                <a:solidFill>
-                  <a:srgbClr val="FFFFFF"/>
-                </a:solidFill>
-              </a:defRPr>
-            </a:pPr>
-            <a:r>
-              <a:t>ST Strategy: Defend (Use Strengths to minimize Threats)</a:t>
-            </a:r>
-          </a:p>
-        </p:txBody>
-      </p:sp>
-      <p:sp>
-        <p:nvSpPr>
-          <p:cNvPr id="3" name="TextBox 2"/>
+          <a:ln>
+            <a:solidFill>
+              <a:srgbClr val="FFFFFF"/>
+            </a:solidFill>
+          </a:ln>
+        </p:spPr>
+        <p:style>
+          <a:lnRef idx="1">
+            <a:schemeClr val="accent1"/>
+          </a:lnRef>
+          <a:fillRef idx="3">
+            <a:schemeClr val="accent1"/>
+          </a:fillRef>
+          <a:effectRef idx="2">
+            <a:schemeClr val="accent1"/>
+          </a:effectRef>
+          <a:fontRef idx="minor">
+            <a:schemeClr val="lt1"/>
+          </a:fontRef>
+        </p:style>
+        <p:txBody>
+          <a:bodyPr rtlCol="0" anchor="ctr"/>
+          <a:lstStyle/>
+          <a:p>
+            <a:pPr algn="ctr"/>
+          </a:p>
+        </p:txBody>
+      </p:sp>
+      <p:sp>
+        <p:nvSpPr>
+          <p:cNvPr id="4" name="TextBox 3"/>
           <p:cNvSpPr txBox="1"/>
           <p:nvPr/>
         </p:nvSpPr>
         <p:spPr>
           <a:xfrm>
-            <a:off x="731520" y="1371600"/>
-            <a:ext cx="7680960" cy="5029200"/>
+            <a:off x="3200400" y="914400"/>
+            <a:ext cx="5486400" cy="731520"/>
           </a:xfrm>
           <a:prstGeom prst="rect">
             <a:avLst/>
@@ -3860,16 +4869,103 @@
           <a:noFill/>
         </p:spPr>
         <p:txBody>
-          <a:bodyPr wrap="square">
+          <a:bodyPr wrap="none">
             <a:spAutoFit/>
           </a:bodyPr>
           <a:lstStyle/>
           <a:p>
             <a:pPr>
-              <a:defRPr sz="1800"/>
-            </a:pPr>
-            <a:r>
-              <a:t>[Add your content here]</a:t>
+              <a:defRPr sz="3600" b="1">
+                <a:solidFill>
+                  <a:srgbClr val="FFFFFF"/>
+                </a:solidFill>
+              </a:defRPr>
+            </a:pPr>
+            <a:r>
+              <a:t>THREATS</a:t>
+            </a:r>
+          </a:p>
+        </p:txBody>
+      </p:sp>
+      <p:sp>
+        <p:nvSpPr>
+          <p:cNvPr id="5" name="TextBox 4"/>
+          <p:cNvSpPr txBox="1"/>
+          <p:nvPr/>
+        </p:nvSpPr>
+        <p:spPr>
+          <a:xfrm>
+            <a:off x="3200400" y="2011680"/>
+            <a:ext cx="5486400" cy="2743200"/>
+          </a:xfrm>
+          <a:prstGeom prst="rect">
+            <a:avLst/>
+          </a:prstGeom>
+          <a:noFill/>
+        </p:spPr>
+        <p:txBody>
+          <a:bodyPr wrap="none">
+            <a:spAutoFit/>
+          </a:bodyPr>
+          <a:lstStyle/>
+          <a:p>
+            <a:pPr>
+              <a:defRPr sz="1600">
+                <a:solidFill>
+                  <a:srgbClr val="FFFFFF"/>
+                </a:solidFill>
+              </a:defRPr>
+            </a:pPr>
+            <a:r>
+              <a:t>• How does crime/theft impact your business?</a:t>
+            </a:r>
+          </a:p>
+          <a:p>
+            <a:pPr>
+              <a:defRPr sz="1600">
+                <a:solidFill>
+                  <a:srgbClr val="FFFFFF"/>
+                </a:solidFill>
+              </a:defRPr>
+            </a:pPr>
+            <a:r>
+              <a:t>• Are competitors offering better prices?</a:t>
+            </a:r>
+          </a:p>
+          <a:p>
+            <a:pPr>
+              <a:defRPr sz="1600">
+                <a:solidFill>
+                  <a:srgbClr val="FFFFFF"/>
+                </a:solidFill>
+              </a:defRPr>
+            </a:pPr>
+            <a:r>
+              <a:t>• Are regulations changing (tax, labor, etc.)?</a:t>
+            </a:r>
+          </a:p>
+          <a:p>
+            <a:pPr>
+              <a:defRPr sz="1600">
+                <a:solidFill>
+                  <a:srgbClr val="FFFFFF"/>
+                </a:solidFill>
+              </a:defRPr>
+            </a:pPr>
+            <a:r>
+              <a:t>• Is your market shrinking?</a:t>
+            </a:r>
+          </a:p>
+          <a:p>
+            <a:pPr>
+              <a:defRPr sz="1600">
+                <a:solidFill>
+                  <a:srgbClr val="FFFFFF"/>
+                </a:solidFill>
+              </a:defRPr>
+            </a:pPr>
+            <a:r>
+              <a:t>• What external risks keep you up at night?</a:t>
             </a:r>
           </a:p>
         </p:txBody>
@@ -3885,6 +4981,14 @@
 <file path=ppt/slides/slide8.xml><?xml version="1.0" encoding="utf-8"?>
 <p:sld xmlns:a="http://schemas.openxmlformats.org/drawingml/2006/main" xmlns:p="http://schemas.openxmlformats.org/presentationml/2006/main" xmlns:r="http://schemas.openxmlformats.org/officeDocument/2006/relationships">
   <p:cSld>
+    <p:bg>
+      <p:bgPr>
+        <a:solidFill>
+          <a:srgbClr val="FFFFFF"/>
+        </a:solidFill>
+        <a:effectLst/>
+      </p:bgPr>
+    </p:bg>
     <p:spTree>
       <p:nvGrpSpPr>
         <p:cNvPr id="1" name=""/>
@@ -3900,45 +5004,88 @@
         </p:nvSpPr>
         <p:spPr>
           <a:xfrm>
-            <a:off x="0" y="0"/>
-            <a:ext cx="9144000" cy="731520"/>
+            <a:off x="457200" y="274320"/>
+            <a:ext cx="8229600" cy="548640"/>
+          </a:xfrm>
+          <a:prstGeom prst="rect">
+            <a:avLst/>
+          </a:prstGeom>
+          <a:noFill/>
+        </p:spPr>
+        <p:txBody>
+          <a:bodyPr wrap="none">
+            <a:spAutoFit/>
+          </a:bodyPr>
+          <a:lstStyle/>
+          <a:p>
+            <a:pPr>
+              <a:defRPr sz="3200" b="1">
+                <a:solidFill>
+                  <a:srgbClr val="101C42"/>
+                </a:solidFill>
+              </a:defRPr>
+            </a:pPr>
+            <a:r>
+              <a:t>TOWS Action Matrix</a:t>
+            </a:r>
+          </a:p>
+        </p:txBody>
+      </p:sp>
+      <p:sp>
+        <p:nvSpPr>
+          <p:cNvPr id="3" name="Rectangle 2"/>
+          <p:cNvSpPr/>
+          <p:nvPr/>
+        </p:nvSpPr>
+        <p:spPr>
+          <a:xfrm>
+            <a:off x="457200" y="1097280"/>
+            <a:ext cx="3931920" cy="1828800"/>
           </a:xfrm>
           <a:prstGeom prst="rect">
             <a:avLst/>
           </a:prstGeom>
           <a:solidFill>
-            <a:srgbClr val="101C42"/>
+            <a:srgbClr val="2980B9"/>
           </a:solidFill>
-        </p:spPr>
-        <p:txBody>
-          <a:bodyPr wrap="none" anchor="ctr" lIns="457200">
-            <a:spAutoFit/>
-          </a:bodyPr>
-          <a:lstStyle/>
-          <a:p>
-            <a:pPr>
-              <a:defRPr sz="2800" b="1">
-                <a:solidFill>
-                  <a:srgbClr val="FFFFFF"/>
-                </a:solidFill>
-              </a:defRPr>
-            </a:pPr>
-            <a:r>
-              <a:t>WO Strategy: Improve (Use Opportunities to overcome Weaknesses)</a:t>
-            </a:r>
-          </a:p>
-        </p:txBody>
-      </p:sp>
-      <p:sp>
-        <p:nvSpPr>
-          <p:cNvPr id="3" name="TextBox 2"/>
+          <a:ln>
+            <a:solidFill>
+              <a:srgbClr val="2980B9"/>
+            </a:solidFill>
+          </a:ln>
+        </p:spPr>
+        <p:style>
+          <a:lnRef idx="1">
+            <a:schemeClr val="accent1"/>
+          </a:lnRef>
+          <a:fillRef idx="3">
+            <a:schemeClr val="accent1"/>
+          </a:fillRef>
+          <a:effectRef idx="2">
+            <a:schemeClr val="accent1"/>
+          </a:effectRef>
+          <a:fontRef idx="minor">
+            <a:schemeClr val="lt1"/>
+          </a:fontRef>
+        </p:style>
+        <p:txBody>
+          <a:bodyPr rtlCol="0" anchor="ctr"/>
+          <a:lstStyle/>
+          <a:p>
+            <a:pPr algn="ctr"/>
+          </a:p>
+        </p:txBody>
+      </p:sp>
+      <p:sp>
+        <p:nvSpPr>
+          <p:cNvPr id="4" name="TextBox 3"/>
           <p:cNvSpPr txBox="1"/>
           <p:nvPr/>
         </p:nvSpPr>
         <p:spPr>
           <a:xfrm>
-            <a:off x="731520" y="1371600"/>
-            <a:ext cx="7680960" cy="5029200"/>
+            <a:off x="640080" y="1280160"/>
+            <a:ext cx="3566160" cy="457200"/>
           </a:xfrm>
           <a:prstGeom prst="rect">
             <a:avLst/>
@@ -3946,16 +5093,588 @@
           <a:noFill/>
         </p:spPr>
         <p:txBody>
-          <a:bodyPr wrap="square">
+          <a:bodyPr wrap="none">
             <a:spAutoFit/>
           </a:bodyPr>
           <a:lstStyle/>
           <a:p>
             <a:pPr>
-              <a:defRPr sz="1800"/>
-            </a:pPr>
-            <a:r>
-              <a:t>[Add your content here]</a:t>
+              <a:defRPr sz="1800" b="1">
+                <a:solidFill>
+                  <a:srgbClr val="FFFFFF"/>
+                </a:solidFill>
+              </a:defRPr>
+            </a:pPr>
+            <a:r>
+              <a:t>Attack Strategies</a:t>
+            </a:r>
+          </a:p>
+        </p:txBody>
+      </p:sp>
+      <p:sp>
+        <p:nvSpPr>
+          <p:cNvPr id="5" name="TextBox 4"/>
+          <p:cNvSpPr txBox="1"/>
+          <p:nvPr/>
+        </p:nvSpPr>
+        <p:spPr>
+          <a:xfrm>
+            <a:off x="640080" y="1828800"/>
+            <a:ext cx="3566160" cy="365760"/>
+          </a:xfrm>
+          <a:prstGeom prst="rect">
+            <a:avLst/>
+          </a:prstGeom>
+          <a:noFill/>
+        </p:spPr>
+        <p:txBody>
+          <a:bodyPr wrap="none">
+            <a:spAutoFit/>
+          </a:bodyPr>
+          <a:lstStyle/>
+          <a:p>
+            <a:pPr>
+              <a:defRPr sz="1200">
+                <a:solidFill>
+                  <a:srgbClr val="FFFFFF"/>
+                </a:solidFill>
+              </a:defRPr>
+            </a:pPr>
+            <a:r>
+              <a:t>Use Strengths to capture Opportunities</a:t>
+            </a:r>
+          </a:p>
+        </p:txBody>
+      </p:sp>
+      <p:sp>
+        <p:nvSpPr>
+          <p:cNvPr id="6" name="TextBox 5"/>
+          <p:cNvSpPr txBox="1"/>
+          <p:nvPr/>
+        </p:nvSpPr>
+        <p:spPr>
+          <a:xfrm>
+            <a:off x="640080" y="2286000"/>
+            <a:ext cx="3566160" cy="548640"/>
+          </a:xfrm>
+          <a:prstGeom prst="rect">
+            <a:avLst/>
+          </a:prstGeom>
+          <a:noFill/>
+        </p:spPr>
+        <p:txBody>
+          <a:bodyPr wrap="none">
+            <a:spAutoFit/>
+          </a:bodyPr>
+          <a:lstStyle/>
+          <a:p>
+            <a:pPr>
+              <a:defRPr sz="1200">
+                <a:solidFill>
+                  <a:srgbClr val="FFFFFF"/>
+                </a:solidFill>
+              </a:defRPr>
+            </a:pPr>
+            <a:r>
+              <a:t>• Strategy 1</a:t>
+            </a:r>
+          </a:p>
+          <a:p>
+            <a:pPr>
+              <a:defRPr sz="1200">
+                <a:solidFill>
+                  <a:srgbClr val="FFFFFF"/>
+                </a:solidFill>
+              </a:defRPr>
+            </a:pPr>
+            <a:r>
+              <a:t>• Strategy 2</a:t>
+            </a:r>
+          </a:p>
+        </p:txBody>
+      </p:sp>
+      <p:sp>
+        <p:nvSpPr>
+          <p:cNvPr id="7" name="Rectangle 6"/>
+          <p:cNvSpPr/>
+          <p:nvPr/>
+        </p:nvSpPr>
+        <p:spPr>
+          <a:xfrm>
+            <a:off x="4572000" y="1097280"/>
+            <a:ext cx="3931920" cy="1828800"/>
+          </a:xfrm>
+          <a:prstGeom prst="rect">
+            <a:avLst/>
+          </a:prstGeom>
+          <a:solidFill>
+            <a:srgbClr val="27AE60"/>
+          </a:solidFill>
+          <a:ln>
+            <a:solidFill>
+              <a:srgbClr val="27AE60"/>
+            </a:solidFill>
+          </a:ln>
+        </p:spPr>
+        <p:style>
+          <a:lnRef idx="1">
+            <a:schemeClr val="accent1"/>
+          </a:lnRef>
+          <a:fillRef idx="3">
+            <a:schemeClr val="accent1"/>
+          </a:fillRef>
+          <a:effectRef idx="2">
+            <a:schemeClr val="accent1"/>
+          </a:effectRef>
+          <a:fontRef idx="minor">
+            <a:schemeClr val="lt1"/>
+          </a:fontRef>
+        </p:style>
+        <p:txBody>
+          <a:bodyPr rtlCol="0" anchor="ctr"/>
+          <a:lstStyle/>
+          <a:p>
+            <a:pPr algn="ctr"/>
+          </a:p>
+        </p:txBody>
+      </p:sp>
+      <p:sp>
+        <p:nvSpPr>
+          <p:cNvPr id="8" name="TextBox 7"/>
+          <p:cNvSpPr txBox="1"/>
+          <p:nvPr/>
+        </p:nvSpPr>
+        <p:spPr>
+          <a:xfrm>
+            <a:off x="4754880" y="1280160"/>
+            <a:ext cx="3566160" cy="457200"/>
+          </a:xfrm>
+          <a:prstGeom prst="rect">
+            <a:avLst/>
+          </a:prstGeom>
+          <a:noFill/>
+        </p:spPr>
+        <p:txBody>
+          <a:bodyPr wrap="none">
+            <a:spAutoFit/>
+          </a:bodyPr>
+          <a:lstStyle/>
+          <a:p>
+            <a:pPr>
+              <a:defRPr sz="1800" b="1">
+                <a:solidFill>
+                  <a:srgbClr val="FFFFFF"/>
+                </a:solidFill>
+              </a:defRPr>
+            </a:pPr>
+            <a:r>
+              <a:t>Defend Strategies</a:t>
+            </a:r>
+          </a:p>
+        </p:txBody>
+      </p:sp>
+      <p:sp>
+        <p:nvSpPr>
+          <p:cNvPr id="9" name="TextBox 8"/>
+          <p:cNvSpPr txBox="1"/>
+          <p:nvPr/>
+        </p:nvSpPr>
+        <p:spPr>
+          <a:xfrm>
+            <a:off x="4754880" y="1828800"/>
+            <a:ext cx="3566160" cy="365760"/>
+          </a:xfrm>
+          <a:prstGeom prst="rect">
+            <a:avLst/>
+          </a:prstGeom>
+          <a:noFill/>
+        </p:spPr>
+        <p:txBody>
+          <a:bodyPr wrap="none">
+            <a:spAutoFit/>
+          </a:bodyPr>
+          <a:lstStyle/>
+          <a:p>
+            <a:pPr>
+              <a:defRPr sz="1200">
+                <a:solidFill>
+                  <a:srgbClr val="FFFFFF"/>
+                </a:solidFill>
+              </a:defRPr>
+            </a:pPr>
+            <a:r>
+              <a:t>Use Strengths to counter Threats</a:t>
+            </a:r>
+          </a:p>
+        </p:txBody>
+      </p:sp>
+      <p:sp>
+        <p:nvSpPr>
+          <p:cNvPr id="10" name="TextBox 9"/>
+          <p:cNvSpPr txBox="1"/>
+          <p:nvPr/>
+        </p:nvSpPr>
+        <p:spPr>
+          <a:xfrm>
+            <a:off x="4754880" y="2286000"/>
+            <a:ext cx="3566160" cy="548640"/>
+          </a:xfrm>
+          <a:prstGeom prst="rect">
+            <a:avLst/>
+          </a:prstGeom>
+          <a:noFill/>
+        </p:spPr>
+        <p:txBody>
+          <a:bodyPr wrap="none">
+            <a:spAutoFit/>
+          </a:bodyPr>
+          <a:lstStyle/>
+          <a:p>
+            <a:pPr>
+              <a:defRPr sz="1200">
+                <a:solidFill>
+                  <a:srgbClr val="FFFFFF"/>
+                </a:solidFill>
+              </a:defRPr>
+            </a:pPr>
+            <a:r>
+              <a:t>• Strategy 1</a:t>
+            </a:r>
+          </a:p>
+          <a:p>
+            <a:pPr>
+              <a:defRPr sz="1200">
+                <a:solidFill>
+                  <a:srgbClr val="FFFFFF"/>
+                </a:solidFill>
+              </a:defRPr>
+            </a:pPr>
+            <a:r>
+              <a:t>• Strategy 2</a:t>
+            </a:r>
+          </a:p>
+        </p:txBody>
+      </p:sp>
+      <p:sp>
+        <p:nvSpPr>
+          <p:cNvPr id="11" name="Rectangle 10"/>
+          <p:cNvSpPr/>
+          <p:nvPr/>
+        </p:nvSpPr>
+        <p:spPr>
+          <a:xfrm>
+            <a:off x="457200" y="3108960"/>
+            <a:ext cx="3931920" cy="1828800"/>
+          </a:xfrm>
+          <a:prstGeom prst="rect">
+            <a:avLst/>
+          </a:prstGeom>
+          <a:solidFill>
+            <a:srgbClr val="F39C12"/>
+          </a:solidFill>
+          <a:ln>
+            <a:solidFill>
+              <a:srgbClr val="F39C12"/>
+            </a:solidFill>
+          </a:ln>
+        </p:spPr>
+        <p:style>
+          <a:lnRef idx="1">
+            <a:schemeClr val="accent1"/>
+          </a:lnRef>
+          <a:fillRef idx="3">
+            <a:schemeClr val="accent1"/>
+          </a:fillRef>
+          <a:effectRef idx="2">
+            <a:schemeClr val="accent1"/>
+          </a:effectRef>
+          <a:fontRef idx="minor">
+            <a:schemeClr val="lt1"/>
+          </a:fontRef>
+        </p:style>
+        <p:txBody>
+          <a:bodyPr rtlCol="0" anchor="ctr"/>
+          <a:lstStyle/>
+          <a:p>
+            <a:pPr algn="ctr"/>
+          </a:p>
+        </p:txBody>
+      </p:sp>
+      <p:sp>
+        <p:nvSpPr>
+          <p:cNvPr id="12" name="TextBox 11"/>
+          <p:cNvSpPr txBox="1"/>
+          <p:nvPr/>
+        </p:nvSpPr>
+        <p:spPr>
+          <a:xfrm>
+            <a:off x="640080" y="3291840"/>
+            <a:ext cx="3566160" cy="457200"/>
+          </a:xfrm>
+          <a:prstGeom prst="rect">
+            <a:avLst/>
+          </a:prstGeom>
+          <a:noFill/>
+        </p:spPr>
+        <p:txBody>
+          <a:bodyPr wrap="none">
+            <a:spAutoFit/>
+          </a:bodyPr>
+          <a:lstStyle/>
+          <a:p>
+            <a:pPr>
+              <a:defRPr sz="1800" b="1">
+                <a:solidFill>
+                  <a:srgbClr val="FFFFFF"/>
+                </a:solidFill>
+              </a:defRPr>
+            </a:pPr>
+            <a:r>
+              <a:t>Improve Strategies</a:t>
+            </a:r>
+          </a:p>
+        </p:txBody>
+      </p:sp>
+      <p:sp>
+        <p:nvSpPr>
+          <p:cNvPr id="13" name="TextBox 12"/>
+          <p:cNvSpPr txBox="1"/>
+          <p:nvPr/>
+        </p:nvSpPr>
+        <p:spPr>
+          <a:xfrm>
+            <a:off x="640080" y="3840480"/>
+            <a:ext cx="3566160" cy="365760"/>
+          </a:xfrm>
+          <a:prstGeom prst="rect">
+            <a:avLst/>
+          </a:prstGeom>
+          <a:noFill/>
+        </p:spPr>
+        <p:txBody>
+          <a:bodyPr wrap="none">
+            <a:spAutoFit/>
+          </a:bodyPr>
+          <a:lstStyle/>
+          <a:p>
+            <a:pPr>
+              <a:defRPr sz="1200">
+                <a:solidFill>
+                  <a:srgbClr val="FFFFFF"/>
+                </a:solidFill>
+              </a:defRPr>
+            </a:pPr>
+            <a:r>
+              <a:t>Fix Weaknesses to capture Opportunities</a:t>
+            </a:r>
+          </a:p>
+        </p:txBody>
+      </p:sp>
+      <p:sp>
+        <p:nvSpPr>
+          <p:cNvPr id="14" name="TextBox 13"/>
+          <p:cNvSpPr txBox="1"/>
+          <p:nvPr/>
+        </p:nvSpPr>
+        <p:spPr>
+          <a:xfrm>
+            <a:off x="640080" y="4297680"/>
+            <a:ext cx="3566160" cy="548640"/>
+          </a:xfrm>
+          <a:prstGeom prst="rect">
+            <a:avLst/>
+          </a:prstGeom>
+          <a:noFill/>
+        </p:spPr>
+        <p:txBody>
+          <a:bodyPr wrap="none">
+            <a:spAutoFit/>
+          </a:bodyPr>
+          <a:lstStyle/>
+          <a:p>
+            <a:pPr>
+              <a:defRPr sz="1200">
+                <a:solidFill>
+                  <a:srgbClr val="FFFFFF"/>
+                </a:solidFill>
+              </a:defRPr>
+            </a:pPr>
+            <a:r>
+              <a:t>• Strategy 1</a:t>
+            </a:r>
+          </a:p>
+          <a:p>
+            <a:pPr>
+              <a:defRPr sz="1200">
+                <a:solidFill>
+                  <a:srgbClr val="FFFFFF"/>
+                </a:solidFill>
+              </a:defRPr>
+            </a:pPr>
+            <a:r>
+              <a:t>• Strategy 2</a:t>
+            </a:r>
+          </a:p>
+        </p:txBody>
+      </p:sp>
+      <p:sp>
+        <p:nvSpPr>
+          <p:cNvPr id="15" name="Rectangle 14"/>
+          <p:cNvSpPr/>
+          <p:nvPr/>
+        </p:nvSpPr>
+        <p:spPr>
+          <a:xfrm>
+            <a:off x="4572000" y="3108960"/>
+            <a:ext cx="3931920" cy="1828800"/>
+          </a:xfrm>
+          <a:prstGeom prst="rect">
+            <a:avLst/>
+          </a:prstGeom>
+          <a:solidFill>
+            <a:srgbClr val="E74C3C"/>
+          </a:solidFill>
+          <a:ln>
+            <a:solidFill>
+              <a:srgbClr val="E74C3C"/>
+            </a:solidFill>
+          </a:ln>
+        </p:spPr>
+        <p:style>
+          <a:lnRef idx="1">
+            <a:schemeClr val="accent1"/>
+          </a:lnRef>
+          <a:fillRef idx="3">
+            <a:schemeClr val="accent1"/>
+          </a:fillRef>
+          <a:effectRef idx="2">
+            <a:schemeClr val="accent1"/>
+          </a:effectRef>
+          <a:fontRef idx="minor">
+            <a:schemeClr val="lt1"/>
+          </a:fontRef>
+        </p:style>
+        <p:txBody>
+          <a:bodyPr rtlCol="0" anchor="ctr"/>
+          <a:lstStyle/>
+          <a:p>
+            <a:pPr algn="ctr"/>
+          </a:p>
+        </p:txBody>
+      </p:sp>
+      <p:sp>
+        <p:nvSpPr>
+          <p:cNvPr id="16" name="TextBox 15"/>
+          <p:cNvSpPr txBox="1"/>
+          <p:nvPr/>
+        </p:nvSpPr>
+        <p:spPr>
+          <a:xfrm>
+            <a:off x="4754880" y="3291840"/>
+            <a:ext cx="3566160" cy="457200"/>
+          </a:xfrm>
+          <a:prstGeom prst="rect">
+            <a:avLst/>
+          </a:prstGeom>
+          <a:noFill/>
+        </p:spPr>
+        <p:txBody>
+          <a:bodyPr wrap="none">
+            <a:spAutoFit/>
+          </a:bodyPr>
+          <a:lstStyle/>
+          <a:p>
+            <a:pPr>
+              <a:defRPr sz="1800" b="1">
+                <a:solidFill>
+                  <a:srgbClr val="FFFFFF"/>
+                </a:solidFill>
+              </a:defRPr>
+            </a:pPr>
+            <a:r>
+              <a:t>Survive Strategies</a:t>
+            </a:r>
+          </a:p>
+        </p:txBody>
+      </p:sp>
+      <p:sp>
+        <p:nvSpPr>
+          <p:cNvPr id="17" name="TextBox 16"/>
+          <p:cNvSpPr txBox="1"/>
+          <p:nvPr/>
+        </p:nvSpPr>
+        <p:spPr>
+          <a:xfrm>
+            <a:off x="4754880" y="3840480"/>
+            <a:ext cx="3566160" cy="365760"/>
+          </a:xfrm>
+          <a:prstGeom prst="rect">
+            <a:avLst/>
+          </a:prstGeom>
+          <a:noFill/>
+        </p:spPr>
+        <p:txBody>
+          <a:bodyPr wrap="none">
+            <a:spAutoFit/>
+          </a:bodyPr>
+          <a:lstStyle/>
+          <a:p>
+            <a:pPr>
+              <a:defRPr sz="1200">
+                <a:solidFill>
+                  <a:srgbClr val="FFFFFF"/>
+                </a:solidFill>
+              </a:defRPr>
+            </a:pPr>
+            <a:r>
+              <a:t>Minimize Weaknesses and avoid Threats</a:t>
+            </a:r>
+          </a:p>
+        </p:txBody>
+      </p:sp>
+      <p:sp>
+        <p:nvSpPr>
+          <p:cNvPr id="18" name="TextBox 17"/>
+          <p:cNvSpPr txBox="1"/>
+          <p:nvPr/>
+        </p:nvSpPr>
+        <p:spPr>
+          <a:xfrm>
+            <a:off x="4754880" y="4297680"/>
+            <a:ext cx="3566160" cy="548640"/>
+          </a:xfrm>
+          <a:prstGeom prst="rect">
+            <a:avLst/>
+          </a:prstGeom>
+          <a:noFill/>
+        </p:spPr>
+        <p:txBody>
+          <a:bodyPr wrap="none">
+            <a:spAutoFit/>
+          </a:bodyPr>
+          <a:lstStyle/>
+          <a:p>
+            <a:pPr>
+              <a:defRPr sz="1200">
+                <a:solidFill>
+                  <a:srgbClr val="FFFFFF"/>
+                </a:solidFill>
+              </a:defRPr>
+            </a:pPr>
+            <a:r>
+              <a:t>• Strategy 1</a:t>
+            </a:r>
+          </a:p>
+          <a:p>
+            <a:pPr>
+              <a:defRPr sz="1200">
+                <a:solidFill>
+                  <a:srgbClr val="FFFFFF"/>
+                </a:solidFill>
+              </a:defRPr>
+            </a:pPr>
+            <a:r>
+              <a:t>• Strategy 2</a:t>
             </a:r>
           </a:p>
         </p:txBody>
@@ -3971,6 +5690,14 @@
 <file path=ppt/slides/slide9.xml><?xml version="1.0" encoding="utf-8"?>
 <p:sld xmlns:a="http://schemas.openxmlformats.org/drawingml/2006/main" xmlns:p="http://schemas.openxmlformats.org/presentationml/2006/main" xmlns:r="http://schemas.openxmlformats.org/officeDocument/2006/relationships">
   <p:cSld>
+    <p:bg>
+      <p:bgPr>
+        <a:solidFill>
+          <a:srgbClr val="101C42"/>
+        </a:solidFill>
+        <a:effectLst/>
+      </p:bgPr>
+    </p:bg>
     <p:spTree>
       <p:nvGrpSpPr>
         <p:cNvPr id="1" name=""/>
@@ -3986,45 +5713,8 @@
         </p:nvSpPr>
         <p:spPr>
           <a:xfrm>
-            <a:off x="0" y="0"/>
-            <a:ext cx="9144000" cy="731520"/>
-          </a:xfrm>
-          <a:prstGeom prst="rect">
-            <a:avLst/>
-          </a:prstGeom>
-          <a:solidFill>
-            <a:srgbClr val="101C42"/>
-          </a:solidFill>
-        </p:spPr>
-        <p:txBody>
-          <a:bodyPr wrap="none" anchor="ctr" lIns="457200">
-            <a:spAutoFit/>
-          </a:bodyPr>
-          <a:lstStyle/>
-          <a:p>
-            <a:pPr>
-              <a:defRPr sz="2800" b="1">
-                <a:solidFill>
-                  <a:srgbClr val="FFFFFF"/>
-                </a:solidFill>
-              </a:defRPr>
-            </a:pPr>
-            <a:r>
-              <a:t>WT Strategy: Survive (Minimize Weaknesses to avoid Threats)</a:t>
-            </a:r>
-          </a:p>
-        </p:txBody>
-      </p:sp>
-      <p:sp>
-        <p:nvSpPr>
-          <p:cNvPr id="3" name="TextBox 2"/>
-          <p:cNvSpPr txBox="1"/>
-          <p:nvPr/>
-        </p:nvSpPr>
-        <p:spPr>
-          <a:xfrm>
-            <a:off x="731520" y="1371600"/>
-            <a:ext cx="7680960" cy="5029200"/>
+            <a:off x="914400" y="914400"/>
+            <a:ext cx="7315200" cy="731520"/>
           </a:xfrm>
           <a:prstGeom prst="rect">
             <a:avLst/>
@@ -4032,16 +5722,139 @@
           <a:noFill/>
         </p:spPr>
         <p:txBody>
-          <a:bodyPr wrap="square">
+          <a:bodyPr wrap="none">
             <a:spAutoFit/>
           </a:bodyPr>
           <a:lstStyle/>
           <a:p>
-            <a:pPr>
-              <a:defRPr sz="1800"/>
-            </a:pPr>
-            <a:r>
-              <a:t>[Add your content here]</a:t>
+            <a:pPr algn="ctr">
+              <a:defRPr sz="3600" b="1">
+                <a:solidFill>
+                  <a:srgbClr val="FFFFFF"/>
+                </a:solidFill>
+              </a:defRPr>
+            </a:pPr>
+            <a:r>
+              <a:t>Your Next Steps</a:t>
+            </a:r>
+          </a:p>
+        </p:txBody>
+      </p:sp>
+      <p:sp>
+        <p:nvSpPr>
+          <p:cNvPr id="3" name="TextBox 2"/>
+          <p:cNvSpPr txBox="1"/>
+          <p:nvPr/>
+        </p:nvSpPr>
+        <p:spPr>
+          <a:xfrm>
+            <a:off x="1828800" y="2011680"/>
+            <a:ext cx="5486400" cy="2743200"/>
+          </a:xfrm>
+          <a:prstGeom prst="rect">
+            <a:avLst/>
+          </a:prstGeom>
+          <a:noFill/>
+        </p:spPr>
+        <p:txBody>
+          <a:bodyPr wrap="none">
+            <a:spAutoFit/>
+          </a:bodyPr>
+          <a:lstStyle/>
+          <a:p>
+            <a:pPr>
+              <a:defRPr sz="1800">
+                <a:solidFill>
+                  <a:srgbClr val="FFFFFF"/>
+                </a:solidFill>
+              </a:defRPr>
+            </a:pPr>
+            <a:r>
+              <a:t>1. Complete the SWOT worksheet in Excel</a:t>
+            </a:r>
+          </a:p>
+          <a:p>
+            <a:pPr>
+              <a:defRPr sz="1800">
+                <a:solidFill>
+                  <a:srgbClr val="FFFFFF"/>
+                </a:solidFill>
+              </a:defRPr>
+            </a:pPr>
+          </a:p>
+          <a:p>
+            <a:pPr>
+              <a:defRPr sz="1800">
+                <a:solidFill>
+                  <a:srgbClr val="FFFFFF"/>
+                </a:solidFill>
+              </a:defRPr>
+            </a:pPr>
+            <a:r>
+              <a:t>2. Develop 2-3 strategies for each TOWS quadrant</a:t>
+            </a:r>
+          </a:p>
+          <a:p>
+            <a:pPr>
+              <a:defRPr sz="1800">
+                <a:solidFill>
+                  <a:srgbClr val="FFFFFF"/>
+                </a:solidFill>
+              </a:defRPr>
+            </a:pPr>
+          </a:p>
+          <a:p>
+            <a:pPr>
+              <a:defRPr sz="1800">
+                <a:solidFill>
+                  <a:srgbClr val="FFFFFF"/>
+                </a:solidFill>
+              </a:defRPr>
+            </a:pPr>
+            <a:r>
+              <a:t>3. Prioritize your top 3 strategies</a:t>
+            </a:r>
+          </a:p>
+          <a:p>
+            <a:pPr>
+              <a:defRPr sz="1800">
+                <a:solidFill>
+                  <a:srgbClr val="FFFFFF"/>
+                </a:solidFill>
+              </a:defRPr>
+            </a:pPr>
+          </a:p>
+          <a:p>
+            <a:pPr>
+              <a:defRPr sz="1800">
+                <a:solidFill>
+                  <a:srgbClr val="FFFFFF"/>
+                </a:solidFill>
+              </a:defRPr>
+            </a:pPr>
+            <a:r>
+              <a:t>4. Create action plans with deadlines</a:t>
+            </a:r>
+          </a:p>
+          <a:p>
+            <a:pPr>
+              <a:defRPr sz="1800">
+                <a:solidFill>
+                  <a:srgbClr val="FFFFFF"/>
+                </a:solidFill>
+              </a:defRPr>
+            </a:pPr>
+          </a:p>
+          <a:p>
+            <a:pPr>
+              <a:defRPr sz="1800">
+                <a:solidFill>
+                  <a:srgbClr val="FFFFFF"/>
+                </a:solidFill>
+              </a:defRPr>
+            </a:pPr>
+            <a:r>
+              <a:t>5. Review quarterly and update</a:t>
             </a:r>
           </a:p>
         </p:txBody>

</xml_diff>